<commit_message>
modified logoo and added to PPT template
</commit_message>
<xml_diff>
--- a/docs/hpgmg-template.pptx
+++ b/docs/hpgmg-template.pptx
@@ -379,7 +379,7 @@
     </p:spTree>
     <p:extLst>
       <p:ext uri="{BB962C8B-B14F-4D97-AF65-F5344CB8AC3E}">
-        <p14:creationId xmlns:mc="http://schemas.openxmlformats.org/markup-compatibility/2006" xmlns:mv="urn:schemas-microsoft-com:mac:vml" xmlns:p14="http://schemas.microsoft.com/office/powerpoint/2010/main" xmlns:p="http://schemas.openxmlformats.org/presentationml/2006/main" xmlns:r="http://schemas.openxmlformats.org/officeDocument/2006/relationships" xmlns:a="http://schemas.openxmlformats.org/drawingml/2006/main" xmlns="" val="2698250618"/>
+        <p14:creationId xmlns="" xmlns:a="http://schemas.openxmlformats.org/drawingml/2006/main" xmlns:r="http://schemas.openxmlformats.org/officeDocument/2006/relationships" xmlns:p="http://schemas.openxmlformats.org/presentationml/2006/main" xmlns:p14="http://schemas.microsoft.com/office/powerpoint/2010/main" xmlns:mv="urn:schemas-microsoft-com:mac:vml" xmlns:mc="http://schemas.openxmlformats.org/markup-compatibility/2006" val="2698250618"/>
       </p:ext>
     </p:extLst>
   </p:cSld>
@@ -714,7 +714,7 @@
     </p:spTree>
     <p:extLst>
       <p:ext uri="{BB962C8B-B14F-4D97-AF65-F5344CB8AC3E}">
-        <p14:creationId xmlns:mc="http://schemas.openxmlformats.org/markup-compatibility/2006" xmlns:mv="urn:schemas-microsoft-com:mac:vml" xmlns:p14="http://schemas.microsoft.com/office/powerpoint/2010/main" xmlns:p="http://schemas.openxmlformats.org/presentationml/2006/main" xmlns:r="http://schemas.openxmlformats.org/officeDocument/2006/relationships" xmlns:a="http://schemas.openxmlformats.org/drawingml/2006/main" xmlns="" val="235717496"/>
+        <p14:creationId xmlns="" xmlns:a="http://schemas.openxmlformats.org/drawingml/2006/main" xmlns:r="http://schemas.openxmlformats.org/officeDocument/2006/relationships" xmlns:p="http://schemas.openxmlformats.org/presentationml/2006/main" xmlns:p14="http://schemas.microsoft.com/office/powerpoint/2010/main" xmlns:mv="urn:schemas-microsoft-com:mac:vml" xmlns:mc="http://schemas.openxmlformats.org/markup-compatibility/2006" val="235717496"/>
       </p:ext>
     </p:extLst>
   </p:cSld>
@@ -1312,7 +1312,7 @@
       </p:sp>
       <p:pic>
         <p:nvPicPr>
-          <p:cNvPr id="27" name="Picture 26" descr="HPGMG-logo2.png"/>
+          <p:cNvPr id="17" name="Picture 16" descr="HPGMG-logo2.png"/>
           <p:cNvPicPr>
             <a:picLocks noChangeAspect="1"/>
           </p:cNvPicPr>
@@ -1326,8 +1326,8 @@
         </p:blipFill>
         <p:spPr>
           <a:xfrm>
-            <a:off x="65022" y="58926"/>
-            <a:ext cx="3504911" cy="923205"/>
+            <a:off x="0" y="0"/>
+            <a:ext cx="4664600" cy="1315557"/>
           </a:xfrm>
           <a:prstGeom prst="rect">
             <a:avLst/>
@@ -3175,8 +3175,8 @@
         </p:nvSpPr>
         <p:spPr bwMode="auto">
           <a:xfrm>
-            <a:off x="3581400" y="152400"/>
-            <a:ext cx="5323518" cy="809625"/>
+            <a:off x="3500485" y="152400"/>
+            <a:ext cx="5404433" cy="809625"/>
           </a:xfrm>
           <a:prstGeom prst="rect">
             <a:avLst/>
@@ -3300,7 +3300,7 @@
       </p:sp>
       <p:pic>
         <p:nvPicPr>
-          <p:cNvPr id="24" name="Picture 23" descr="HPGMG-logo2.png"/>
+          <p:cNvPr id="12" name="Picture 11" descr="HPGMG-logo2.png"/>
           <p:cNvPicPr>
             <a:picLocks noChangeAspect="1"/>
           </p:cNvPicPr>
@@ -3314,8 +3314,8 @@
         </p:blipFill>
         <p:spPr>
           <a:xfrm>
-            <a:off x="39619" y="33869"/>
-            <a:ext cx="3440181" cy="906155"/>
+            <a:off x="0" y="10341"/>
+            <a:ext cx="3451641" cy="973466"/>
           </a:xfrm>
           <a:prstGeom prst="rect">
             <a:avLst/>

</xml_diff>

<commit_message>
added 1.0 to title for tech report
</commit_message>
<xml_diff>
--- a/docs/hpgmg-template.pptx
+++ b/docs/hpgmg-template.pptx
@@ -1326,8 +1326,8 @@
         </p:blipFill>
         <p:spPr>
           <a:xfrm>
-            <a:off x="0" y="0"/>
-            <a:ext cx="4664600" cy="1315557"/>
+            <a:off x="101603" y="84670"/>
+            <a:ext cx="5373659" cy="1515533"/>
           </a:xfrm>
           <a:prstGeom prst="rect">
             <a:avLst/>
@@ -1423,7 +1423,7 @@
         </p:nvSpPr>
         <p:spPr>
           <a:xfrm>
-            <a:off x="3530600" y="152400"/>
+            <a:off x="3599450" y="152400"/>
             <a:ext cx="5374318" cy="809625"/>
           </a:xfrm>
         </p:spPr>
@@ -1474,16 +1474,21 @@
             <p:ph type="title"/>
           </p:nvPr>
         </p:nvSpPr>
-        <p:spPr/>
+        <p:spPr>
+          <a:xfrm>
+            <a:off x="3622885" y="152400"/>
+            <a:ext cx="5404433" cy="809625"/>
+          </a:xfrm>
+        </p:spPr>
         <p:txBody>
           <a:bodyPr/>
           <a:lstStyle/>
           <a:p>
             <a:r>
-              <a:rPr lang="en-US" smtClean="0"/>
+              <a:rPr lang="en-US" dirty="0" smtClean="0"/>
               <a:t>Click to edit Master title style</a:t>
             </a:r>
-            <a:endParaRPr lang="en-US"/>
+            <a:endParaRPr lang="en-US" dirty="0"/>
           </a:p>
         </p:txBody>
       </p:sp>
@@ -1733,8 +1738,8 @@
         </p:nvSpPr>
         <p:spPr>
           <a:xfrm>
-            <a:off x="3539066" y="274638"/>
-            <a:ext cx="5147733" cy="648229"/>
+            <a:off x="3592616" y="175970"/>
+            <a:ext cx="5274061" cy="746898"/>
           </a:xfrm>
         </p:spPr>
         <p:txBody>
@@ -2127,16 +2132,21 @@
             <p:ph type="title"/>
           </p:nvPr>
         </p:nvSpPr>
-        <p:spPr/>
+        <p:spPr>
+          <a:xfrm>
+            <a:off x="3615235" y="152400"/>
+            <a:ext cx="5404433" cy="809625"/>
+          </a:xfrm>
+        </p:spPr>
         <p:txBody>
           <a:bodyPr/>
           <a:lstStyle/>
           <a:p>
             <a:r>
-              <a:rPr lang="en-US" smtClean="0"/>
+              <a:rPr lang="en-US" dirty="0" smtClean="0"/>
               <a:t>Click to edit Master title style</a:t>
             </a:r>
-            <a:endParaRPr lang="en-US"/>
+            <a:endParaRPr lang="en-US" dirty="0"/>
           </a:p>
         </p:txBody>
       </p:sp>
@@ -2278,7 +2288,12 @@
             <p:ph type="title"/>
           </p:nvPr>
         </p:nvSpPr>
-        <p:spPr/>
+        <p:spPr>
+          <a:xfrm>
+            <a:off x="3615235" y="152400"/>
+            <a:ext cx="5404433" cy="809625"/>
+          </a:xfrm>
+        </p:spPr>
         <p:txBody>
           <a:bodyPr/>
           <a:lstStyle/>
@@ -2419,7 +2434,7 @@
         </p:nvSpPr>
         <p:spPr>
           <a:xfrm>
-            <a:off x="3556000" y="152400"/>
+            <a:off x="3594250" y="152400"/>
             <a:ext cx="5003800" cy="809625"/>
           </a:xfrm>
         </p:spPr>
@@ -2968,6 +2983,7 @@
             <a:prstTxWarp prst="textNoShape">
               <a:avLst/>
             </a:prstTxWarp>
+            <a:normAutofit/>
           </a:bodyPr>
           <a:lstStyle/>
           <a:p>
@@ -3175,7 +3191,7 @@
         </p:nvSpPr>
         <p:spPr bwMode="auto">
           <a:xfrm>
-            <a:off x="3500485" y="152400"/>
+            <a:off x="3576985" y="152400"/>
             <a:ext cx="5404433" cy="809625"/>
           </a:xfrm>
           <a:prstGeom prst="rect">

</xml_diff>